<commit_message>
adding label lifecycle slide/image
</commit_message>
<xml_diff>
--- a/oreilly-sa-2018/img/label-lifecycle.pptx
+++ b/oreilly-sa-2018/img/label-lifecycle.pptx
@@ -104,6 +104,11 @@
       </a:defRPr>
     </a:lvl9pPr>
   </p:defaultTextStyle>
+  <p:extLst>
+    <p:ext uri="{EFAFB233-063F-42B5-8137-9DF3F51BA10A}">
+      <p15:sldGuideLst xmlns:p15="http://schemas.microsoft.com/office/powerpoint/2012/main"/>
+    </p:ext>
+  </p:extLst>
 </p:presentation>
 </file>
 
@@ -254,7 +259,7 @@
           <a:p>
             <a:fld id="{BF27764D-9418-014D-B37C-E151C7EA89D3}" type="datetimeFigureOut">
               <a:rPr lang="en-US" smtClean="0"/>
-              <a:t>10/26/18</a:t>
+              <a:t>10/28/18</a:t>
             </a:fld>
             <a:endParaRPr lang="en-US"/>
           </a:p>
@@ -452,7 +457,7 @@
           <a:p>
             <a:fld id="{BF27764D-9418-014D-B37C-E151C7EA89D3}" type="datetimeFigureOut">
               <a:rPr lang="en-US" smtClean="0"/>
-              <a:t>10/26/18</a:t>
+              <a:t>10/28/18</a:t>
             </a:fld>
             <a:endParaRPr lang="en-US"/>
           </a:p>
@@ -660,7 +665,7 @@
           <a:p>
             <a:fld id="{BF27764D-9418-014D-B37C-E151C7EA89D3}" type="datetimeFigureOut">
               <a:rPr lang="en-US" smtClean="0"/>
-              <a:t>10/26/18</a:t>
+              <a:t>10/28/18</a:t>
             </a:fld>
             <a:endParaRPr lang="en-US"/>
           </a:p>
@@ -858,7 +863,7 @@
           <a:p>
             <a:fld id="{BF27764D-9418-014D-B37C-E151C7EA89D3}" type="datetimeFigureOut">
               <a:rPr lang="en-US" smtClean="0"/>
-              <a:t>10/26/18</a:t>
+              <a:t>10/28/18</a:t>
             </a:fld>
             <a:endParaRPr lang="en-US"/>
           </a:p>
@@ -1133,7 +1138,7 @@
           <a:p>
             <a:fld id="{BF27764D-9418-014D-B37C-E151C7EA89D3}" type="datetimeFigureOut">
               <a:rPr lang="en-US" smtClean="0"/>
-              <a:t>10/26/18</a:t>
+              <a:t>10/28/18</a:t>
             </a:fld>
             <a:endParaRPr lang="en-US"/>
           </a:p>
@@ -1398,7 +1403,7 @@
           <a:p>
             <a:fld id="{BF27764D-9418-014D-B37C-E151C7EA89D3}" type="datetimeFigureOut">
               <a:rPr lang="en-US" smtClean="0"/>
-              <a:t>10/26/18</a:t>
+              <a:t>10/28/18</a:t>
             </a:fld>
             <a:endParaRPr lang="en-US"/>
           </a:p>
@@ -1810,7 +1815,7 @@
           <a:p>
             <a:fld id="{BF27764D-9418-014D-B37C-E151C7EA89D3}" type="datetimeFigureOut">
               <a:rPr lang="en-US" smtClean="0"/>
-              <a:t>10/26/18</a:t>
+              <a:t>10/28/18</a:t>
             </a:fld>
             <a:endParaRPr lang="en-US"/>
           </a:p>
@@ -1951,7 +1956,7 @@
           <a:p>
             <a:fld id="{BF27764D-9418-014D-B37C-E151C7EA89D3}" type="datetimeFigureOut">
               <a:rPr lang="en-US" smtClean="0"/>
-              <a:t>10/26/18</a:t>
+              <a:t>10/28/18</a:t>
             </a:fld>
             <a:endParaRPr lang="en-US"/>
           </a:p>
@@ -2064,7 +2069,7 @@
           <a:p>
             <a:fld id="{BF27764D-9418-014D-B37C-E151C7EA89D3}" type="datetimeFigureOut">
               <a:rPr lang="en-US" smtClean="0"/>
-              <a:t>10/26/18</a:t>
+              <a:t>10/28/18</a:t>
             </a:fld>
             <a:endParaRPr lang="en-US"/>
           </a:p>
@@ -2375,7 +2380,7 @@
           <a:p>
             <a:fld id="{BF27764D-9418-014D-B37C-E151C7EA89D3}" type="datetimeFigureOut">
               <a:rPr lang="en-US" smtClean="0"/>
-              <a:t>10/26/18</a:t>
+              <a:t>10/28/18</a:t>
             </a:fld>
             <a:endParaRPr lang="en-US"/>
           </a:p>
@@ -2663,7 +2668,7 @@
           <a:p>
             <a:fld id="{BF27764D-9418-014D-B37C-E151C7EA89D3}" type="datetimeFigureOut">
               <a:rPr lang="en-US" smtClean="0"/>
-              <a:t>10/26/18</a:t>
+              <a:t>10/28/18</a:t>
             </a:fld>
             <a:endParaRPr lang="en-US"/>
           </a:p>
@@ -2904,7 +2909,7 @@
           <a:p>
             <a:fld id="{BF27764D-9418-014D-B37C-E151C7EA89D3}" type="datetimeFigureOut">
               <a:rPr lang="en-US" smtClean="0"/>
-              <a:t>10/26/18</a:t>
+              <a:t>10/28/18</a:t>
             </a:fld>
             <a:endParaRPr lang="en-US"/>
           </a:p>
@@ -3455,7 +3460,7 @@
         </p:blipFill>
         <p:spPr>
           <a:xfrm>
-            <a:off x="4582714" y="1919290"/>
+            <a:off x="4582717" y="2055864"/>
             <a:ext cx="3026566" cy="3026566"/>
           </a:xfrm>
           <a:prstGeom prst="rect">
@@ -3577,7 +3582,7 @@
             <a:pPr algn="ctr"/>
             <a:r>
               <a:rPr lang="en-US" dirty="0"/>
-              <a:t>Create</a:t>
+              <a:t>Design</a:t>
             </a:r>
           </a:p>
         </p:txBody>
@@ -4315,6 +4320,148 @@
             <a:r>
               <a:rPr lang="en-US" dirty="0"/>
               <a:t>Monitor</a:t>
+            </a:r>
+          </a:p>
+        </p:txBody>
+      </p:sp>
+      <p:pic>
+        <p:nvPicPr>
+          <p:cNvPr id="5" name="Graphic 4" descr="Baby">
+            <a:extLst>
+              <a:ext uri="{FF2B5EF4-FFF2-40B4-BE49-F238E27FC236}">
+                <a16:creationId xmlns:a16="http://schemas.microsoft.com/office/drawing/2014/main" id="{0D60463B-3908-CC43-A3C7-82B611CC3EBC}"/>
+              </a:ext>
+            </a:extLst>
+          </p:cNvPr>
+          <p:cNvPicPr>
+            <a:picLocks noChangeAspect="1"/>
+          </p:cNvPicPr>
+          <p:nvPr/>
+        </p:nvPicPr>
+        <p:blipFill>
+          <a:blip r:embed="rId4">
+            <a:extLst>
+              <a:ext uri="{96DAC541-7B7A-43D3-8B79-37D633B846F1}">
+                <asvg:svgBlip xmlns:asvg="http://schemas.microsoft.com/office/drawing/2016/SVG/main" r:embed="rId5"/>
+              </a:ext>
+            </a:extLst>
+          </a:blip>
+          <a:stretch>
+            <a:fillRect/>
+          </a:stretch>
+        </p:blipFill>
+        <p:spPr>
+          <a:xfrm>
+            <a:off x="5875865" y="1278166"/>
+            <a:ext cx="457202" cy="457202"/>
+          </a:xfrm>
+          <a:prstGeom prst="rect">
+            <a:avLst/>
+          </a:prstGeom>
+        </p:spPr>
+      </p:pic>
+      <p:pic>
+        <p:nvPicPr>
+          <p:cNvPr id="9" name="Graphic 8" descr="Person with Cane">
+            <a:extLst>
+              <a:ext uri="{FF2B5EF4-FFF2-40B4-BE49-F238E27FC236}">
+                <a16:creationId xmlns:a16="http://schemas.microsoft.com/office/drawing/2014/main" id="{DDA7AC64-DB15-7747-B76D-D2E8082A2C2D}"/>
+              </a:ext>
+            </a:extLst>
+          </p:cNvPr>
+          <p:cNvPicPr>
+            <a:picLocks noChangeAspect="1"/>
+          </p:cNvPicPr>
+          <p:nvPr/>
+        </p:nvPicPr>
+        <p:blipFill>
+          <a:blip r:embed="rId6">
+            <a:extLst>
+              <a:ext uri="{96DAC541-7B7A-43D3-8B79-37D633B846F1}">
+                <asvg:svgBlip xmlns:asvg="http://schemas.microsoft.com/office/drawing/2016/SVG/main" r:embed="rId7"/>
+              </a:ext>
+            </a:extLst>
+          </a:blip>
+          <a:stretch>
+            <a:fillRect/>
+          </a:stretch>
+        </p:blipFill>
+        <p:spPr>
+          <a:xfrm>
+            <a:off x="5867399" y="5383349"/>
+            <a:ext cx="457203" cy="457203"/>
+          </a:xfrm>
+          <a:prstGeom prst="rect">
+            <a:avLst/>
+          </a:prstGeom>
+        </p:spPr>
+      </p:pic>
+      <p:sp>
+        <p:nvSpPr>
+          <p:cNvPr id="31" name="TextBox 30">
+            <a:extLst>
+              <a:ext uri="{FF2B5EF4-FFF2-40B4-BE49-F238E27FC236}">
+                <a16:creationId xmlns:a16="http://schemas.microsoft.com/office/drawing/2014/main" id="{C6A54470-EF4F-8B4F-B86F-1EFED1C3CBC9}"/>
+              </a:ext>
+            </a:extLst>
+          </p:cNvPr>
+          <p:cNvSpPr txBox="1"/>
+          <p:nvPr/>
+        </p:nvSpPr>
+        <p:spPr>
+          <a:xfrm>
+            <a:off x="5661682" y="1796178"/>
+            <a:ext cx="868636" cy="400110"/>
+          </a:xfrm>
+          <a:prstGeom prst="rect">
+            <a:avLst/>
+          </a:prstGeom>
+          <a:noFill/>
+        </p:spPr>
+        <p:txBody>
+          <a:bodyPr wrap="none" rtlCol="0">
+            <a:spAutoFit/>
+          </a:bodyPr>
+          <a:lstStyle/>
+          <a:p>
+            <a:r>
+              <a:rPr lang="en-US" sz="2000" dirty="0"/>
+              <a:t>Create</a:t>
+            </a:r>
+          </a:p>
+        </p:txBody>
+      </p:sp>
+      <p:sp>
+        <p:nvSpPr>
+          <p:cNvPr id="32" name="TextBox 31">
+            <a:extLst>
+              <a:ext uri="{FF2B5EF4-FFF2-40B4-BE49-F238E27FC236}">
+                <a16:creationId xmlns:a16="http://schemas.microsoft.com/office/drawing/2014/main" id="{D900AE1C-3EA6-DE49-9D60-52D907F92533}"/>
+              </a:ext>
+            </a:extLst>
+          </p:cNvPr>
+          <p:cNvSpPr txBox="1"/>
+          <p:nvPr/>
+        </p:nvSpPr>
+        <p:spPr>
+          <a:xfrm>
+            <a:off x="5672667" y="4938710"/>
+            <a:ext cx="807016" cy="400110"/>
+          </a:xfrm>
+          <a:prstGeom prst="rect">
+            <a:avLst/>
+          </a:prstGeom>
+          <a:noFill/>
+        </p:spPr>
+        <p:txBody>
+          <a:bodyPr wrap="none" rtlCol="0">
+            <a:spAutoFit/>
+          </a:bodyPr>
+          <a:lstStyle/>
+          <a:p>
+            <a:r>
+              <a:rPr lang="en-US" sz="2000" dirty="0"/>
+              <a:t>Retire</a:t>
             </a:r>
           </a:p>
         </p:txBody>

</xml_diff>